<commit_message>
Added Licencing to files
</commit_message>
<xml_diff>
--- a/src/Environment.pptx
+++ b/src/Environment.pptx
@@ -119,13 +119,98 @@
 <file path=ppt/revisionInfo.xml><?xml version="1.0" encoding="utf-8"?>
 <p1510:revInfo xmlns:a="http://schemas.openxmlformats.org/drawingml/2006/main" xmlns:r="http://schemas.openxmlformats.org/officeDocument/2006/relationships" xmlns:p1510="http://schemas.microsoft.com/office/powerpoint/2015/10/main">
   <p1510:revLst>
-    <p1510:client id="{17F8D2F0-E2BA-4986-9E94-CA8D4C2C15DC}" v="198" dt="2019-05-14T12:36:32.037"/>
+    <p1510:client id="{E3A3C3F2-988E-4D0B-B37A-996B8F66C167}" v="53" dt="2019-07-16T16:04:28.784"/>
   </p1510:revLst>
 </p1510:revInfo>
 </file>
 
 <file path=ppt/changesInfos/changesInfo1.xml><?xml version="1.0" encoding="utf-8"?>
 <pc:chgInfo xmlns:a="http://schemas.openxmlformats.org/drawingml/2006/main" xmlns:r="http://schemas.openxmlformats.org/officeDocument/2006/relationships" xmlns:ac="http://schemas.microsoft.com/office/drawing/2013/main/command" xmlns:pc="http://schemas.microsoft.com/office/powerpoint/2013/main/command">
+  <pc:docChgLst>
+    <pc:chgData name="Kerney, Jason" userId="1d545db0-240c-4034-9e97-4382dab14bfe" providerId="ADAL" clId="{A1C5F68E-F886-451F-9910-7450905A6EB0}"/>
+    <pc:docChg chg="custSel addSld delSld modSld">
+      <pc:chgData name="Kerney, Jason" userId="1d545db0-240c-4034-9e97-4382dab14bfe" providerId="ADAL" clId="{A1C5F68E-F886-451F-9910-7450905A6EB0}" dt="2019-04-22T20:40:06.121" v="16" actId="20577"/>
+      <pc:docMkLst>
+        <pc:docMk/>
+      </pc:docMkLst>
+      <pc:sldChg chg="modSp">
+        <pc:chgData name="Kerney, Jason" userId="1d545db0-240c-4034-9e97-4382dab14bfe" providerId="ADAL" clId="{A1C5F68E-F886-451F-9910-7450905A6EB0}" dt="2019-04-22T20:39:47.204" v="12" actId="20577"/>
+        <pc:sldMkLst>
+          <pc:docMk/>
+          <pc:sldMk cId="199389094" sldId="256"/>
+        </pc:sldMkLst>
+        <pc:spChg chg="mod">
+          <ac:chgData name="Kerney, Jason" userId="1d545db0-240c-4034-9e97-4382dab14bfe" providerId="ADAL" clId="{A1C5F68E-F886-451F-9910-7450905A6EB0}" dt="2019-04-19T21:22:35.412" v="5" actId="207"/>
+          <ac:spMkLst>
+            <pc:docMk/>
+            <pc:sldMk cId="199389094" sldId="256"/>
+            <ac:spMk id="15" creationId="{9F1EC678-45F6-43BC-B9F2-EFBE0CF5C454}"/>
+          </ac:spMkLst>
+        </pc:spChg>
+        <pc:spChg chg="mod">
+          <ac:chgData name="Kerney, Jason" userId="1d545db0-240c-4034-9e97-4382dab14bfe" providerId="ADAL" clId="{A1C5F68E-F886-451F-9910-7450905A6EB0}" dt="2019-04-22T20:39:47.204" v="12" actId="20577"/>
+          <ac:spMkLst>
+            <pc:docMk/>
+            <pc:sldMk cId="199389094" sldId="256"/>
+            <ac:spMk id="32" creationId="{35C6613F-563E-4E74-9325-C03D1B3866C1}"/>
+          </ac:spMkLst>
+        </pc:spChg>
+      </pc:sldChg>
+      <pc:sldChg chg="modSp">
+        <pc:chgData name="Kerney, Jason" userId="1d545db0-240c-4034-9e97-4382dab14bfe" providerId="ADAL" clId="{A1C5F68E-F886-451F-9910-7450905A6EB0}" dt="2019-04-22T20:39:54.794" v="14" actId="20577"/>
+        <pc:sldMkLst>
+          <pc:docMk/>
+          <pc:sldMk cId="2468527818" sldId="257"/>
+        </pc:sldMkLst>
+        <pc:spChg chg="mod">
+          <ac:chgData name="Kerney, Jason" userId="1d545db0-240c-4034-9e97-4382dab14bfe" providerId="ADAL" clId="{A1C5F68E-F886-451F-9910-7450905A6EB0}" dt="2019-04-19T21:22:40.678" v="6" actId="207"/>
+          <ac:spMkLst>
+            <pc:docMk/>
+            <pc:sldMk cId="2468527818" sldId="257"/>
+            <ac:spMk id="15" creationId="{9F1EC678-45F6-43BC-B9F2-EFBE0CF5C454}"/>
+          </ac:spMkLst>
+        </pc:spChg>
+        <pc:spChg chg="mod">
+          <ac:chgData name="Kerney, Jason" userId="1d545db0-240c-4034-9e97-4382dab14bfe" providerId="ADAL" clId="{A1C5F68E-F886-451F-9910-7450905A6EB0}" dt="2019-04-22T20:39:54.794" v="14" actId="20577"/>
+          <ac:spMkLst>
+            <pc:docMk/>
+            <pc:sldMk cId="2468527818" sldId="257"/>
+            <ac:spMk id="32" creationId="{35C6613F-563E-4E74-9325-C03D1B3866C1}"/>
+          </ac:spMkLst>
+        </pc:spChg>
+      </pc:sldChg>
+      <pc:sldChg chg="modSp">
+        <pc:chgData name="Kerney, Jason" userId="1d545db0-240c-4034-9e97-4382dab14bfe" providerId="ADAL" clId="{A1C5F68E-F886-451F-9910-7450905A6EB0}" dt="2019-04-22T20:40:01.648" v="15" actId="20577"/>
+        <pc:sldMkLst>
+          <pc:docMk/>
+          <pc:sldMk cId="59374401" sldId="258"/>
+        </pc:sldMkLst>
+        <pc:spChg chg="mod">
+          <ac:chgData name="Kerney, Jason" userId="1d545db0-240c-4034-9e97-4382dab14bfe" providerId="ADAL" clId="{A1C5F68E-F886-451F-9910-7450905A6EB0}" dt="2019-04-22T20:40:01.648" v="15" actId="20577"/>
+          <ac:spMkLst>
+            <pc:docMk/>
+            <pc:sldMk cId="59374401" sldId="258"/>
+            <ac:spMk id="32" creationId="{35C6613F-563E-4E74-9325-C03D1B3866C1}"/>
+          </ac:spMkLst>
+        </pc:spChg>
+      </pc:sldChg>
+      <pc:sldChg chg="modSp">
+        <pc:chgData name="Kerney, Jason" userId="1d545db0-240c-4034-9e97-4382dab14bfe" providerId="ADAL" clId="{A1C5F68E-F886-451F-9910-7450905A6EB0}" dt="2019-04-22T20:40:06.121" v="16" actId="20577"/>
+        <pc:sldMkLst>
+          <pc:docMk/>
+          <pc:sldMk cId="118221358" sldId="259"/>
+        </pc:sldMkLst>
+        <pc:spChg chg="mod">
+          <ac:chgData name="Kerney, Jason" userId="1d545db0-240c-4034-9e97-4382dab14bfe" providerId="ADAL" clId="{A1C5F68E-F886-451F-9910-7450905A6EB0}" dt="2019-04-22T20:40:06.121" v="16" actId="20577"/>
+          <ac:spMkLst>
+            <pc:docMk/>
+            <pc:sldMk cId="118221358" sldId="259"/>
+            <ac:spMk id="32" creationId="{35C6613F-563E-4E74-9325-C03D1B3866C1}"/>
+          </ac:spMkLst>
+        </pc:spChg>
+      </pc:sldChg>
+    </pc:docChg>
+  </pc:docChgLst>
   <pc:docChgLst>
     <pc:chgData name="Kerney, Jason" userId="1d545db0-240c-4034-9e97-4382dab14bfe" providerId="ADAL" clId="{17F8D2F0-E2BA-4986-9E94-CA8D4C2C15DC}"/>
     <pc:docChg chg="undo custSel addSld modSld">
@@ -326,87 +411,174 @@
     </pc:docChg>
   </pc:docChgLst>
   <pc:docChgLst>
-    <pc:chgData name="Kerney, Jason" userId="1d545db0-240c-4034-9e97-4382dab14bfe" providerId="ADAL" clId="{A1C5F68E-F886-451F-9910-7450905A6EB0}"/>
-    <pc:docChg chg="custSel addSld delSld modSld">
-      <pc:chgData name="Kerney, Jason" userId="1d545db0-240c-4034-9e97-4382dab14bfe" providerId="ADAL" clId="{A1C5F68E-F886-451F-9910-7450905A6EB0}" dt="2019-04-22T20:40:06.121" v="16" actId="20577"/>
+    <pc:chgData name="Kerney, Jason" userId="1d545db0-240c-4034-9e97-4382dab14bfe" providerId="ADAL" clId="{E3A3C3F2-988E-4D0B-B37A-996B8F66C167}"/>
+    <pc:docChg chg="undo custSel addSld delSld modSld">
+      <pc:chgData name="Kerney, Jason" userId="1d545db0-240c-4034-9e97-4382dab14bfe" providerId="ADAL" clId="{E3A3C3F2-988E-4D0B-B37A-996B8F66C167}" dt="2019-07-16T16:04:28.784" v="52"/>
       <pc:docMkLst>
         <pc:docMk/>
       </pc:docMkLst>
-      <pc:sldChg chg="modSp">
-        <pc:chgData name="Kerney, Jason" userId="1d545db0-240c-4034-9e97-4382dab14bfe" providerId="ADAL" clId="{A1C5F68E-F886-451F-9910-7450905A6EB0}" dt="2019-04-22T20:39:47.204" v="12" actId="20577"/>
+      <pc:sldChg chg="addSp delSp">
+        <pc:chgData name="Kerney, Jason" userId="1d545db0-240c-4034-9e97-4382dab14bfe" providerId="ADAL" clId="{E3A3C3F2-988E-4D0B-B37A-996B8F66C167}" dt="2019-07-16T16:04:22.683" v="49"/>
         <pc:sldMkLst>
           <pc:docMk/>
           <pc:sldMk cId="199389094" sldId="256"/>
         </pc:sldMkLst>
-        <pc:spChg chg="mod">
-          <ac:chgData name="Kerney, Jason" userId="1d545db0-240c-4034-9e97-4382dab14bfe" providerId="ADAL" clId="{A1C5F68E-F886-451F-9910-7450905A6EB0}" dt="2019-04-19T21:22:35.412" v="5" actId="207"/>
-          <ac:spMkLst>
+        <pc:picChg chg="add del">
+          <ac:chgData name="Kerney, Jason" userId="1d545db0-240c-4034-9e97-4382dab14bfe" providerId="ADAL" clId="{E3A3C3F2-988E-4D0B-B37A-996B8F66C167}" dt="2019-07-16T16:01:05.121" v="28"/>
+          <ac:picMkLst>
             <pc:docMk/>
             <pc:sldMk cId="199389094" sldId="256"/>
-            <ac:spMk id="15" creationId="{9F1EC678-45F6-43BC-B9F2-EFBE0CF5C454}"/>
-          </ac:spMkLst>
-        </pc:spChg>
-        <pc:spChg chg="mod">
-          <ac:chgData name="Kerney, Jason" userId="1d545db0-240c-4034-9e97-4382dab14bfe" providerId="ADAL" clId="{A1C5F68E-F886-451F-9910-7450905A6EB0}" dt="2019-04-22T20:39:47.204" v="12" actId="20577"/>
-          <ac:spMkLst>
+            <ac:picMk id="25" creationId="{074BFF60-CDDA-413F-BBC5-0C9F4F414FB5}"/>
+          </ac:picMkLst>
+        </pc:picChg>
+        <pc:picChg chg="add del">
+          <ac:chgData name="Kerney, Jason" userId="1d545db0-240c-4034-9e97-4382dab14bfe" providerId="ADAL" clId="{E3A3C3F2-988E-4D0B-B37A-996B8F66C167}" dt="2019-07-16T16:02:45.029" v="40"/>
+          <ac:picMkLst>
             <pc:docMk/>
             <pc:sldMk cId="199389094" sldId="256"/>
-            <ac:spMk id="32" creationId="{35C6613F-563E-4E74-9325-C03D1B3866C1}"/>
-          </ac:spMkLst>
-        </pc:spChg>
+            <ac:picMk id="26" creationId="{A24F6CF2-0918-423A-BD37-F4D0FD4F1359}"/>
+          </ac:picMkLst>
+        </pc:picChg>
+        <pc:picChg chg="add">
+          <ac:chgData name="Kerney, Jason" userId="1d545db0-240c-4034-9e97-4382dab14bfe" providerId="ADAL" clId="{E3A3C3F2-988E-4D0B-B37A-996B8F66C167}" dt="2019-07-16T16:04:22.683" v="49"/>
+          <ac:picMkLst>
+            <pc:docMk/>
+            <pc:sldMk cId="199389094" sldId="256"/>
+            <ac:picMk id="27" creationId="{5606EAEC-A714-40EF-849F-066970D6E6DD}"/>
+          </ac:picMkLst>
+        </pc:picChg>
       </pc:sldChg>
-      <pc:sldChg chg="modSp">
-        <pc:chgData name="Kerney, Jason" userId="1d545db0-240c-4034-9e97-4382dab14bfe" providerId="ADAL" clId="{A1C5F68E-F886-451F-9910-7450905A6EB0}" dt="2019-04-22T20:39:54.794" v="14" actId="20577"/>
+      <pc:sldChg chg="addSp delSp modSp">
+        <pc:chgData name="Kerney, Jason" userId="1d545db0-240c-4034-9e97-4382dab14bfe" providerId="ADAL" clId="{E3A3C3F2-988E-4D0B-B37A-996B8F66C167}" dt="2019-07-16T16:04:13.607" v="48" actId="1076"/>
         <pc:sldMkLst>
           <pc:docMk/>
           <pc:sldMk cId="2468527818" sldId="257"/>
         </pc:sldMkLst>
-        <pc:spChg chg="mod">
-          <ac:chgData name="Kerney, Jason" userId="1d545db0-240c-4034-9e97-4382dab14bfe" providerId="ADAL" clId="{A1C5F68E-F886-451F-9910-7450905A6EB0}" dt="2019-04-19T21:22:40.678" v="6" actId="207"/>
-          <ac:spMkLst>
+        <pc:picChg chg="add del mod">
+          <ac:chgData name="Kerney, Jason" userId="1d545db0-240c-4034-9e97-4382dab14bfe" providerId="ADAL" clId="{E3A3C3F2-988E-4D0B-B37A-996B8F66C167}" dt="2019-07-16T16:03:49.061" v="43" actId="478"/>
+          <ac:picMkLst>
             <pc:docMk/>
             <pc:sldMk cId="2468527818" sldId="257"/>
-            <ac:spMk id="15" creationId="{9F1EC678-45F6-43BC-B9F2-EFBE0CF5C454}"/>
-          </ac:spMkLst>
-        </pc:spChg>
-        <pc:spChg chg="mod">
-          <ac:chgData name="Kerney, Jason" userId="1d545db0-240c-4034-9e97-4382dab14bfe" providerId="ADAL" clId="{A1C5F68E-F886-451F-9910-7450905A6EB0}" dt="2019-04-22T20:39:54.794" v="14" actId="20577"/>
-          <ac:spMkLst>
+            <ac:picMk id="3" creationId="{C020B713-AEFE-4CC1-875E-2FA2A29BE029}"/>
+          </ac:picMkLst>
+        </pc:picChg>
+        <pc:picChg chg="add mod">
+          <ac:chgData name="Kerney, Jason" userId="1d545db0-240c-4034-9e97-4382dab14bfe" providerId="ADAL" clId="{E3A3C3F2-988E-4D0B-B37A-996B8F66C167}" dt="2019-07-16T16:04:13.607" v="48" actId="1076"/>
+          <ac:picMkLst>
             <pc:docMk/>
             <pc:sldMk cId="2468527818" sldId="257"/>
-            <ac:spMk id="32" creationId="{35C6613F-563E-4E74-9325-C03D1B3866C1}"/>
-          </ac:spMkLst>
-        </pc:spChg>
+            <ac:picMk id="8" creationId="{C5873101-FD87-439F-8F33-9C54D0CFF529}"/>
+          </ac:picMkLst>
+        </pc:picChg>
+        <pc:picChg chg="add del">
+          <ac:chgData name="Kerney, Jason" userId="1d545db0-240c-4034-9e97-4382dab14bfe" providerId="ADAL" clId="{E3A3C3F2-988E-4D0B-B37A-996B8F66C167}" dt="2019-07-16T16:01:02.325" v="26"/>
+          <ac:picMkLst>
+            <pc:docMk/>
+            <pc:sldMk cId="2468527818" sldId="257"/>
+            <ac:picMk id="33" creationId="{38FA5944-1070-4147-93E2-8B62876243E1}"/>
+          </ac:picMkLst>
+        </pc:picChg>
       </pc:sldChg>
-      <pc:sldChg chg="modSp">
-        <pc:chgData name="Kerney, Jason" userId="1d545db0-240c-4034-9e97-4382dab14bfe" providerId="ADAL" clId="{A1C5F68E-F886-451F-9910-7450905A6EB0}" dt="2019-04-22T20:40:01.648" v="15" actId="20577"/>
+      <pc:sldChg chg="addSp delSp add del">
+        <pc:chgData name="Kerney, Jason" userId="1d545db0-240c-4034-9e97-4382dab14bfe" providerId="ADAL" clId="{E3A3C3F2-988E-4D0B-B37A-996B8F66C167}" dt="2019-07-16T16:04:26.687" v="51"/>
         <pc:sldMkLst>
           <pc:docMk/>
           <pc:sldMk cId="59374401" sldId="258"/>
         </pc:sldMkLst>
-        <pc:spChg chg="mod">
-          <ac:chgData name="Kerney, Jason" userId="1d545db0-240c-4034-9e97-4382dab14bfe" providerId="ADAL" clId="{A1C5F68E-F886-451F-9910-7450905A6EB0}" dt="2019-04-22T20:40:01.648" v="15" actId="20577"/>
-          <ac:spMkLst>
+        <pc:picChg chg="add del">
+          <ac:chgData name="Kerney, Jason" userId="1d545db0-240c-4034-9e97-4382dab14bfe" providerId="ADAL" clId="{E3A3C3F2-988E-4D0B-B37A-996B8F66C167}" dt="2019-07-16T16:00:37.238" v="17"/>
+          <ac:picMkLst>
             <pc:docMk/>
             <pc:sldMk cId="59374401" sldId="258"/>
-            <ac:spMk id="32" creationId="{35C6613F-563E-4E74-9325-C03D1B3866C1}"/>
-          </ac:spMkLst>
-        </pc:spChg>
+            <ac:picMk id="34" creationId="{4233C7E6-E84B-45D6-9CC6-BEEDBFF581CA}"/>
+          </ac:picMkLst>
+        </pc:picChg>
+        <pc:picChg chg="add del">
+          <ac:chgData name="Kerney, Jason" userId="1d545db0-240c-4034-9e97-4382dab14bfe" providerId="ADAL" clId="{E3A3C3F2-988E-4D0B-B37A-996B8F66C167}" dt="2019-07-16T16:00:58.644" v="24"/>
+          <ac:picMkLst>
+            <pc:docMk/>
+            <pc:sldMk cId="59374401" sldId="258"/>
+            <ac:picMk id="40" creationId="{387B624F-3299-40A8-9D68-64CA91481DFA}"/>
+          </ac:picMkLst>
+        </pc:picChg>
+        <pc:picChg chg="add del">
+          <ac:chgData name="Kerney, Jason" userId="1d545db0-240c-4034-9e97-4382dab14bfe" providerId="ADAL" clId="{E3A3C3F2-988E-4D0B-B37A-996B8F66C167}" dt="2019-07-16T16:02:41.920" v="38"/>
+          <ac:picMkLst>
+            <pc:docMk/>
+            <pc:sldMk cId="59374401" sldId="258"/>
+            <ac:picMk id="46" creationId="{7FA56C6C-276E-49CE-BE41-4B8A460F24C6}"/>
+          </ac:picMkLst>
+        </pc:picChg>
+        <pc:picChg chg="add">
+          <ac:chgData name="Kerney, Jason" userId="1d545db0-240c-4034-9e97-4382dab14bfe" providerId="ADAL" clId="{E3A3C3F2-988E-4D0B-B37A-996B8F66C167}" dt="2019-07-16T16:04:26.687" v="51"/>
+          <ac:picMkLst>
+            <pc:docMk/>
+            <pc:sldMk cId="59374401" sldId="258"/>
+            <ac:picMk id="47" creationId="{7A470DE4-F4AC-4F88-AEDA-D76B36943616}"/>
+          </ac:picMkLst>
+        </pc:picChg>
       </pc:sldChg>
-      <pc:sldChg chg="modSp">
-        <pc:chgData name="Kerney, Jason" userId="1d545db0-240c-4034-9e97-4382dab14bfe" providerId="ADAL" clId="{A1C5F68E-F886-451F-9910-7450905A6EB0}" dt="2019-04-22T20:40:06.121" v="16" actId="20577"/>
+      <pc:sldChg chg="addSp delSp">
+        <pc:chgData name="Kerney, Jason" userId="1d545db0-240c-4034-9e97-4382dab14bfe" providerId="ADAL" clId="{E3A3C3F2-988E-4D0B-B37A-996B8F66C167}" dt="2019-07-16T16:04:28.784" v="52"/>
         <pc:sldMkLst>
           <pc:docMk/>
           <pc:sldMk cId="118221358" sldId="259"/>
         </pc:sldMkLst>
-        <pc:spChg chg="mod">
-          <ac:chgData name="Kerney, Jason" userId="1d545db0-240c-4034-9e97-4382dab14bfe" providerId="ADAL" clId="{A1C5F68E-F886-451F-9910-7450905A6EB0}" dt="2019-04-22T20:40:06.121" v="16" actId="20577"/>
-          <ac:spMkLst>
+        <pc:picChg chg="add del">
+          <ac:chgData name="Kerney, Jason" userId="1d545db0-240c-4034-9e97-4382dab14bfe" providerId="ADAL" clId="{E3A3C3F2-988E-4D0B-B37A-996B8F66C167}" dt="2019-07-16T16:00:52.159" v="21"/>
+          <ac:picMkLst>
             <pc:docMk/>
             <pc:sldMk cId="118221358" sldId="259"/>
-            <ac:spMk id="32" creationId="{35C6613F-563E-4E74-9325-C03D1B3866C1}"/>
-          </ac:spMkLst>
-        </pc:spChg>
+            <ac:picMk id="34" creationId="{721C5EA8-E246-47F3-B952-14188854DE58}"/>
+          </ac:picMkLst>
+        </pc:picChg>
+        <pc:picChg chg="add del">
+          <ac:chgData name="Kerney, Jason" userId="1d545db0-240c-4034-9e97-4382dab14bfe" providerId="ADAL" clId="{E3A3C3F2-988E-4D0B-B37A-996B8F66C167}" dt="2019-07-16T16:02:38.793" v="37"/>
+          <ac:picMkLst>
+            <pc:docMk/>
+            <pc:sldMk cId="118221358" sldId="259"/>
+            <ac:picMk id="38" creationId="{395EBC0D-BC3E-4007-8020-B16578283998}"/>
+          </ac:picMkLst>
+        </pc:picChg>
+        <pc:picChg chg="add">
+          <ac:chgData name="Kerney, Jason" userId="1d545db0-240c-4034-9e97-4382dab14bfe" providerId="ADAL" clId="{E3A3C3F2-988E-4D0B-B37A-996B8F66C167}" dt="2019-07-16T16:04:28.784" v="52"/>
+          <ac:picMkLst>
+            <pc:docMk/>
+            <pc:sldMk cId="118221358" sldId="259"/>
+            <ac:picMk id="40" creationId="{E5A1F57E-E581-4558-BD8D-62CE242D9A87}"/>
+          </ac:picMkLst>
+        </pc:picChg>
+      </pc:sldChg>
+      <pc:sldChg chg="addSp delSp">
+        <pc:chgData name="Kerney, Jason" userId="1d545db0-240c-4034-9e97-4382dab14bfe" providerId="ADAL" clId="{E3A3C3F2-988E-4D0B-B37A-996B8F66C167}" dt="2019-07-16T16:04:24.211" v="50"/>
+        <pc:sldMkLst>
+          <pc:docMk/>
+          <pc:sldMk cId="1328527795" sldId="260"/>
+        </pc:sldMkLst>
+        <pc:picChg chg="add del">
+          <ac:chgData name="Kerney, Jason" userId="1d545db0-240c-4034-9e97-4382dab14bfe" providerId="ADAL" clId="{E3A3C3F2-988E-4D0B-B37A-996B8F66C167}" dt="2019-07-16T16:01:03.720" v="27"/>
+          <ac:picMkLst>
+            <pc:docMk/>
+            <pc:sldMk cId="1328527795" sldId="260"/>
+            <ac:picMk id="33" creationId="{8A917B0D-CA6B-4887-8DAB-B946C6ACB8C1}"/>
+          </ac:picMkLst>
+        </pc:picChg>
+        <pc:picChg chg="add del">
+          <ac:chgData name="Kerney, Jason" userId="1d545db0-240c-4034-9e97-4382dab14bfe" providerId="ADAL" clId="{E3A3C3F2-988E-4D0B-B37A-996B8F66C167}" dt="2019-07-16T16:02:44.156" v="39"/>
+          <ac:picMkLst>
+            <pc:docMk/>
+            <pc:sldMk cId="1328527795" sldId="260"/>
+            <ac:picMk id="38" creationId="{96EF11FA-A124-44EA-B740-3277355DC565}"/>
+          </ac:picMkLst>
+        </pc:picChg>
+        <pc:picChg chg="add">
+          <ac:chgData name="Kerney, Jason" userId="1d545db0-240c-4034-9e97-4382dab14bfe" providerId="ADAL" clId="{E3A3C3F2-988E-4D0B-B37A-996B8F66C167}" dt="2019-07-16T16:04:24.211" v="50"/>
+          <ac:picMkLst>
+            <pc:docMk/>
+            <pc:sldMk cId="1328527795" sldId="260"/>
+            <ac:picMk id="40" creationId="{C6E0268C-FBB0-4334-B2C9-879D53F1AD5C}"/>
+          </ac:picMkLst>
+        </pc:picChg>
       </pc:sldChg>
     </pc:docChg>
   </pc:docChgLst>
@@ -560,7 +732,7 @@
           <a:p>
             <a:fld id="{D9DB7B70-439A-44DB-B222-AFF05EA5D654}" type="datetimeFigureOut">
               <a:rPr lang="en-US" smtClean="0"/>
-              <a:t>7/15/2019</a:t>
+              <a:t>7/16/2019</a:t>
             </a:fld>
             <a:endParaRPr lang="en-US"/>
           </a:p>
@@ -758,7 +930,7 @@
           <a:p>
             <a:fld id="{D9DB7B70-439A-44DB-B222-AFF05EA5D654}" type="datetimeFigureOut">
               <a:rPr lang="en-US" smtClean="0"/>
-              <a:t>7/15/2019</a:t>
+              <a:t>7/16/2019</a:t>
             </a:fld>
             <a:endParaRPr lang="en-US"/>
           </a:p>
@@ -966,7 +1138,7 @@
           <a:p>
             <a:fld id="{D9DB7B70-439A-44DB-B222-AFF05EA5D654}" type="datetimeFigureOut">
               <a:rPr lang="en-US" smtClean="0"/>
-              <a:t>7/15/2019</a:t>
+              <a:t>7/16/2019</a:t>
             </a:fld>
             <a:endParaRPr lang="en-US"/>
           </a:p>
@@ -1164,7 +1336,7 @@
           <a:p>
             <a:fld id="{D9DB7B70-439A-44DB-B222-AFF05EA5D654}" type="datetimeFigureOut">
               <a:rPr lang="en-US" smtClean="0"/>
-              <a:t>7/15/2019</a:t>
+              <a:t>7/16/2019</a:t>
             </a:fld>
             <a:endParaRPr lang="en-US"/>
           </a:p>
@@ -1439,7 +1611,7 @@
           <a:p>
             <a:fld id="{D9DB7B70-439A-44DB-B222-AFF05EA5D654}" type="datetimeFigureOut">
               <a:rPr lang="en-US" smtClean="0"/>
-              <a:t>7/15/2019</a:t>
+              <a:t>7/16/2019</a:t>
             </a:fld>
             <a:endParaRPr lang="en-US"/>
           </a:p>
@@ -1704,7 +1876,7 @@
           <a:p>
             <a:fld id="{D9DB7B70-439A-44DB-B222-AFF05EA5D654}" type="datetimeFigureOut">
               <a:rPr lang="en-US" smtClean="0"/>
-              <a:t>7/15/2019</a:t>
+              <a:t>7/16/2019</a:t>
             </a:fld>
             <a:endParaRPr lang="en-US"/>
           </a:p>
@@ -2116,7 +2288,7 @@
           <a:p>
             <a:fld id="{D9DB7B70-439A-44DB-B222-AFF05EA5D654}" type="datetimeFigureOut">
               <a:rPr lang="en-US" smtClean="0"/>
-              <a:t>7/15/2019</a:t>
+              <a:t>7/16/2019</a:t>
             </a:fld>
             <a:endParaRPr lang="en-US"/>
           </a:p>
@@ -2257,7 +2429,7 @@
           <a:p>
             <a:fld id="{D9DB7B70-439A-44DB-B222-AFF05EA5D654}" type="datetimeFigureOut">
               <a:rPr lang="en-US" smtClean="0"/>
-              <a:t>7/15/2019</a:t>
+              <a:t>7/16/2019</a:t>
             </a:fld>
             <a:endParaRPr lang="en-US"/>
           </a:p>
@@ -2370,7 +2542,7 @@
           <a:p>
             <a:fld id="{D9DB7B70-439A-44DB-B222-AFF05EA5D654}" type="datetimeFigureOut">
               <a:rPr lang="en-US" smtClean="0"/>
-              <a:t>7/15/2019</a:t>
+              <a:t>7/16/2019</a:t>
             </a:fld>
             <a:endParaRPr lang="en-US"/>
           </a:p>
@@ -2681,7 +2853,7 @@
           <a:p>
             <a:fld id="{D9DB7B70-439A-44DB-B222-AFF05EA5D654}" type="datetimeFigureOut">
               <a:rPr lang="en-US" smtClean="0"/>
-              <a:t>7/15/2019</a:t>
+              <a:t>7/16/2019</a:t>
             </a:fld>
             <a:endParaRPr lang="en-US"/>
           </a:p>
@@ -2969,7 +3141,7 @@
           <a:p>
             <a:fld id="{D9DB7B70-439A-44DB-B222-AFF05EA5D654}" type="datetimeFigureOut">
               <a:rPr lang="en-US" smtClean="0"/>
-              <a:t>7/15/2019</a:t>
+              <a:t>7/16/2019</a:t>
             </a:fld>
             <a:endParaRPr lang="en-US"/>
           </a:p>
@@ -3210,7 +3382,7 @@
           <a:p>
             <a:fld id="{D9DB7B70-439A-44DB-B222-AFF05EA5D654}" type="datetimeFigureOut">
               <a:rPr lang="en-US" smtClean="0"/>
-              <a:t>7/15/2019</a:t>
+              <a:t>7/16/2019</a:t>
             </a:fld>
             <a:endParaRPr lang="en-US"/>
           </a:p>
@@ -4762,6 +4934,42 @@
           </a:p>
         </p:txBody>
       </p:sp>
+      <p:pic>
+        <p:nvPicPr>
+          <p:cNvPr id="27" name="Picture 26">
+            <a:extLst>
+              <a:ext uri="{FF2B5EF4-FFF2-40B4-BE49-F238E27FC236}">
+                <a16:creationId xmlns:a16="http://schemas.microsoft.com/office/drawing/2014/main" id="{5606EAEC-A714-40EF-849F-066970D6E6DD}"/>
+              </a:ext>
+            </a:extLst>
+          </p:cNvPr>
+          <p:cNvPicPr>
+            <a:picLocks noChangeAspect="1"/>
+          </p:cNvPicPr>
+          <p:nvPr/>
+        </p:nvPicPr>
+        <p:blipFill>
+          <a:blip r:embed="rId2">
+            <a:extLst>
+              <a:ext uri="{28A0092B-C50C-407E-A947-70E740481C1C}">
+                <a14:useLocalDpi xmlns:a14="http://schemas.microsoft.com/office/drawing/2010/main" val="0"/>
+              </a:ext>
+            </a:extLst>
+          </a:blip>
+          <a:stretch>
+            <a:fillRect/>
+          </a:stretch>
+        </p:blipFill>
+        <p:spPr>
+          <a:xfrm>
+            <a:off x="11051796" y="236369"/>
+            <a:ext cx="838200" cy="295275"/>
+          </a:xfrm>
+          <a:prstGeom prst="rect">
+            <a:avLst/>
+          </a:prstGeom>
+        </p:spPr>
+      </p:pic>
     </p:spTree>
     <p:extLst>
       <p:ext uri="{BB962C8B-B14F-4D97-AF65-F5344CB8AC3E}">
@@ -5986,6 +6194,42 @@
           </a:prstGeom>
         </p:spPr>
       </p:pic>
+      <p:pic>
+        <p:nvPicPr>
+          <p:cNvPr id="40" name="Picture 39">
+            <a:extLst>
+              <a:ext uri="{FF2B5EF4-FFF2-40B4-BE49-F238E27FC236}">
+                <a16:creationId xmlns:a16="http://schemas.microsoft.com/office/drawing/2014/main" id="{C6E0268C-FBB0-4334-B2C9-879D53F1AD5C}"/>
+              </a:ext>
+            </a:extLst>
+          </p:cNvPr>
+          <p:cNvPicPr>
+            <a:picLocks noChangeAspect="1"/>
+          </p:cNvPicPr>
+          <p:nvPr/>
+        </p:nvPicPr>
+        <p:blipFill>
+          <a:blip r:embed="rId3">
+            <a:extLst>
+              <a:ext uri="{28A0092B-C50C-407E-A947-70E740481C1C}">
+                <a14:useLocalDpi xmlns:a14="http://schemas.microsoft.com/office/drawing/2010/main" val="0"/>
+              </a:ext>
+            </a:extLst>
+          </a:blip>
+          <a:stretch>
+            <a:fillRect/>
+          </a:stretch>
+        </p:blipFill>
+        <p:spPr>
+          <a:xfrm>
+            <a:off x="11051796" y="236369"/>
+            <a:ext cx="838200" cy="295275"/>
+          </a:xfrm>
+          <a:prstGeom prst="rect">
+            <a:avLst/>
+          </a:prstGeom>
+        </p:spPr>
+      </p:pic>
     </p:spTree>
     <p:extLst>
       <p:ext uri="{BB962C8B-B14F-4D97-AF65-F5344CB8AC3E}">
@@ -7134,6 +7378,42 @@
           <a:xfrm>
             <a:off x="360726" y="596105"/>
             <a:ext cx="2178938" cy="977409"/>
+          </a:xfrm>
+          <a:prstGeom prst="rect">
+            <a:avLst/>
+          </a:prstGeom>
+        </p:spPr>
+      </p:pic>
+      <p:pic>
+        <p:nvPicPr>
+          <p:cNvPr id="8" name="Picture 7">
+            <a:extLst>
+              <a:ext uri="{FF2B5EF4-FFF2-40B4-BE49-F238E27FC236}">
+                <a16:creationId xmlns:a16="http://schemas.microsoft.com/office/drawing/2014/main" id="{C5873101-FD87-439F-8F33-9C54D0CFF529}"/>
+              </a:ext>
+            </a:extLst>
+          </p:cNvPr>
+          <p:cNvPicPr>
+            <a:picLocks noChangeAspect="1"/>
+          </p:cNvPicPr>
+          <p:nvPr/>
+        </p:nvPicPr>
+        <p:blipFill>
+          <a:blip r:embed="rId3">
+            <a:extLst>
+              <a:ext uri="{28A0092B-C50C-407E-A947-70E740481C1C}">
+                <a14:useLocalDpi xmlns:a14="http://schemas.microsoft.com/office/drawing/2010/main" val="0"/>
+              </a:ext>
+            </a:extLst>
+          </a:blip>
+          <a:stretch>
+            <a:fillRect/>
+          </a:stretch>
+        </p:blipFill>
+        <p:spPr>
+          <a:xfrm>
+            <a:off x="11051796" y="236369"/>
+            <a:ext cx="838200" cy="295275"/>
           </a:xfrm>
           <a:prstGeom prst="rect">
             <a:avLst/>
@@ -8529,6 +8809,42 @@
           </a:prstGeom>
         </p:spPr>
       </p:pic>
+      <p:pic>
+        <p:nvPicPr>
+          <p:cNvPr id="47" name="Picture 46">
+            <a:extLst>
+              <a:ext uri="{FF2B5EF4-FFF2-40B4-BE49-F238E27FC236}">
+                <a16:creationId xmlns:a16="http://schemas.microsoft.com/office/drawing/2014/main" id="{7A470DE4-F4AC-4F88-AEDA-D76B36943616}"/>
+              </a:ext>
+            </a:extLst>
+          </p:cNvPr>
+          <p:cNvPicPr>
+            <a:picLocks noChangeAspect="1"/>
+          </p:cNvPicPr>
+          <p:nvPr/>
+        </p:nvPicPr>
+        <p:blipFill>
+          <a:blip r:embed="rId3">
+            <a:extLst>
+              <a:ext uri="{28A0092B-C50C-407E-A947-70E740481C1C}">
+                <a14:useLocalDpi xmlns:a14="http://schemas.microsoft.com/office/drawing/2010/main" val="0"/>
+              </a:ext>
+            </a:extLst>
+          </a:blip>
+          <a:stretch>
+            <a:fillRect/>
+          </a:stretch>
+        </p:blipFill>
+        <p:spPr>
+          <a:xfrm>
+            <a:off x="11051796" y="236369"/>
+            <a:ext cx="838200" cy="295275"/>
+          </a:xfrm>
+          <a:prstGeom prst="rect">
+            <a:avLst/>
+          </a:prstGeom>
+        </p:spPr>
+      </p:pic>
     </p:spTree>
     <p:extLst>
       <p:ext uri="{BB962C8B-B14F-4D97-AF65-F5344CB8AC3E}">
@@ -9687,6 +10003,42 @@
           <a:xfrm>
             <a:off x="360726" y="596105"/>
             <a:ext cx="2178938" cy="977409"/>
+          </a:xfrm>
+          <a:prstGeom prst="rect">
+            <a:avLst/>
+          </a:prstGeom>
+        </p:spPr>
+      </p:pic>
+      <p:pic>
+        <p:nvPicPr>
+          <p:cNvPr id="40" name="Picture 39">
+            <a:extLst>
+              <a:ext uri="{FF2B5EF4-FFF2-40B4-BE49-F238E27FC236}">
+                <a16:creationId xmlns:a16="http://schemas.microsoft.com/office/drawing/2014/main" id="{E5A1F57E-E581-4558-BD8D-62CE242D9A87}"/>
+              </a:ext>
+            </a:extLst>
+          </p:cNvPr>
+          <p:cNvPicPr>
+            <a:picLocks noChangeAspect="1"/>
+          </p:cNvPicPr>
+          <p:nvPr/>
+        </p:nvPicPr>
+        <p:blipFill>
+          <a:blip r:embed="rId3">
+            <a:extLst>
+              <a:ext uri="{28A0092B-C50C-407E-A947-70E740481C1C}">
+                <a14:useLocalDpi xmlns:a14="http://schemas.microsoft.com/office/drawing/2010/main" val="0"/>
+              </a:ext>
+            </a:extLst>
+          </a:blip>
+          <a:stretch>
+            <a:fillRect/>
+          </a:stretch>
+        </p:blipFill>
+        <p:spPr>
+          <a:xfrm>
+            <a:off x="11051796" y="236369"/>
+            <a:ext cx="838200" cy="295275"/>
           </a:xfrm>
           <a:prstGeom prst="rect">
             <a:avLst/>

</xml_diff>